<commit_message>
Updated graphs for step-wise model
</commit_message>
<xml_diff>
--- a/breast cancer/Breast Cancer.pptx
+++ b/breast cancer/Breast Cancer.pptx
@@ -399,7 +399,7 @@
           <a:p>
             <a:fld id="{78ABE3C1-DBE1-495D-B57B-2849774B866A}" type="datetimeFigureOut">
               <a:rPr lang="en-US" dirty="0"/>
-              <a:t>9/2/18</a:t>
+              <a:t>9/6/18</a:t>
             </a:fld>
             <a:endParaRPr lang="en-US" dirty="0"/>
           </a:p>
@@ -808,7 +808,7 @@
           <a:p>
             <a:fld id="{446C117F-5CCF-4837-BE5F-2B92066CAFAF}" type="datetimeFigureOut">
               <a:rPr lang="en-US" dirty="0"/>
-              <a:t>9/2/18</a:t>
+              <a:t>9/6/18</a:t>
             </a:fld>
             <a:endParaRPr lang="en-US" dirty="0"/>
           </a:p>
@@ -1139,7 +1139,7 @@
           <a:p>
             <a:fld id="{84EB90BD-B6CE-46B7-997F-7313B992CCDC}" type="datetimeFigureOut">
               <a:rPr lang="en-US" dirty="0"/>
-              <a:t>9/2/18</a:t>
+              <a:t>9/6/18</a:t>
             </a:fld>
             <a:endParaRPr lang="en-US" dirty="0"/>
           </a:p>
@@ -1539,7 +1539,7 @@
           <a:p>
             <a:fld id="{CDB9D11F-B188-461D-B23F-39381795C052}" type="datetimeFigureOut">
               <a:rPr lang="en-US" dirty="0"/>
-              <a:t>9/2/18</a:t>
+              <a:t>9/6/18</a:t>
             </a:fld>
             <a:endParaRPr lang="en-US" dirty="0"/>
           </a:p>
@@ -2102,7 +2102,7 @@
           <a:p>
             <a:fld id="{52E6D8D9-55A2-4063-B0F3-121F44549695}" type="datetimeFigureOut">
               <a:rPr lang="en-US" dirty="0"/>
-              <a:t>9/2/18</a:t>
+              <a:t>9/6/18</a:t>
             </a:fld>
             <a:endParaRPr lang="en-US" dirty="0"/>
           </a:p>
@@ -2778,7 +2778,7 @@
           <a:p>
             <a:fld id="{D4B24536-994D-4021-A283-9F449C0DB509}" type="datetimeFigureOut">
               <a:rPr lang="en-US" dirty="0"/>
-              <a:t>9/2/18</a:t>
+              <a:t>9/6/18</a:t>
             </a:fld>
             <a:endParaRPr lang="en-US" dirty="0"/>
           </a:p>
@@ -3686,7 +3686,7 @@
           <a:p>
             <a:fld id="{3CBBBB78-C96F-47B7-AB17-D852CA960AC9}" type="datetimeFigureOut">
               <a:rPr lang="en-US" dirty="0"/>
-              <a:t>9/2/18</a:t>
+              <a:t>9/6/18</a:t>
             </a:fld>
             <a:endParaRPr lang="en-US" dirty="0"/>
           </a:p>
@@ -3994,7 +3994,7 @@
           <a:p>
             <a:fld id="{1FA3F48C-C7C6-4055-9F49-3777875E72AE}" type="datetimeFigureOut">
               <a:rPr lang="en-US" dirty="0"/>
-              <a:t>9/2/18</a:t>
+              <a:t>9/6/18</a:t>
             </a:fld>
             <a:endParaRPr lang="en-US" dirty="0"/>
           </a:p>
@@ -4253,7 +4253,7 @@
           <a:p>
             <a:fld id="{6178E61D-D431-422C-9764-11DAFE33AB63}" type="datetimeFigureOut">
               <a:rPr lang="en-US" dirty="0"/>
-              <a:t>9/2/18</a:t>
+              <a:t>9/6/18</a:t>
             </a:fld>
             <a:endParaRPr lang="en-US" dirty="0"/>
           </a:p>
@@ -4572,7 +4572,7 @@
           <a:p>
             <a:fld id="{12DE42F4-6EEF-4EF7-8ED4-2208F0F89A08}" type="datetimeFigureOut">
               <a:rPr lang="en-US" dirty="0"/>
-              <a:t>9/2/18</a:t>
+              <a:t>9/6/18</a:t>
             </a:fld>
             <a:endParaRPr lang="en-US" dirty="0"/>
           </a:p>
@@ -4956,7 +4956,7 @@
           <a:p>
             <a:fld id="{30578ACC-22D6-47C1-A373-4FD133E34F3C}" type="datetimeFigureOut">
               <a:rPr lang="en-US" dirty="0"/>
-              <a:t>9/2/18</a:t>
+              <a:t>9/6/18</a:t>
             </a:fld>
             <a:endParaRPr lang="en-US" dirty="0"/>
           </a:p>
@@ -5327,7 +5327,7 @@
           <a:p>
             <a:fld id="{4E5A6C69-6797-4E8A-BF37-F2C3751466E9}" type="datetimeFigureOut">
               <a:rPr lang="en-US" dirty="0"/>
-              <a:t>9/2/18</a:t>
+              <a:t>9/6/18</a:t>
             </a:fld>
             <a:endParaRPr lang="en-US" dirty="0"/>
           </a:p>
@@ -5828,7 +5828,7 @@
           <a:p>
             <a:fld id="{D82014A1-A632-4878-A0D3-F52BA7563730}" type="datetimeFigureOut">
               <a:rPr lang="en-US" dirty="0"/>
-              <a:t>9/2/18</a:t>
+              <a:t>9/6/18</a:t>
             </a:fld>
             <a:endParaRPr lang="en-US" dirty="0"/>
           </a:p>
@@ -6080,7 +6080,7 @@
           <a:p>
             <a:fld id="{CE99F462-093F-4566-844B-4C71F2739DA5}" type="datetimeFigureOut">
               <a:rPr lang="en-US" dirty="0"/>
-              <a:t>9/2/18</a:t>
+              <a:t>9/6/18</a:t>
             </a:fld>
             <a:endParaRPr lang="en-US" dirty="0"/>
           </a:p>
@@ -6238,7 +6238,7 @@
           <a:p>
             <a:fld id="{3D24A7AC-904D-4781-85BA-7D10C17ED021}" type="datetimeFigureOut">
               <a:rPr lang="en-US" dirty="0"/>
-              <a:t>9/2/18</a:t>
+              <a:t>9/6/18</a:t>
             </a:fld>
             <a:endParaRPr lang="en-US" dirty="0"/>
           </a:p>
@@ -6623,7 +6623,7 @@
           <a:p>
             <a:fld id="{E331444B-B92B-4E27-8C94-BB93EAF5CB18}" type="datetimeFigureOut">
               <a:rPr lang="en-US" dirty="0"/>
-              <a:t>9/2/18</a:t>
+              <a:t>9/6/18</a:t>
             </a:fld>
             <a:endParaRPr lang="en-US" dirty="0"/>
           </a:p>
@@ -7027,7 +7027,7 @@
           <a:p>
             <a:fld id="{363EFA5E-FA76-400D-B3DC-F0BA90E6D107}" type="datetimeFigureOut">
               <a:rPr lang="en-US" dirty="0"/>
-              <a:t>9/2/18</a:t>
+              <a:t>9/6/18</a:t>
             </a:fld>
             <a:endParaRPr lang="en-US" dirty="0"/>
           </a:p>
@@ -7266,7 +7266,7 @@
           <a:p>
             <a:fld id="{9D6E9DEC-419B-4CC5-A080-3B06BD5A8291}" type="datetimeFigureOut">
               <a:rPr lang="en-US" dirty="0"/>
-              <a:t>9/2/18</a:t>
+              <a:t>9/6/18</a:t>
             </a:fld>
             <a:endParaRPr lang="en-US" dirty="0"/>
           </a:p>
@@ -8157,10 +8157,10 @@
       </p:sp>
       <p:pic>
         <p:nvPicPr>
-          <p:cNvPr id="9" name="Picture 8">
+          <p:cNvPr id="10" name="Picture 9">
             <a:extLst>
               <a:ext uri="{FF2B5EF4-FFF2-40B4-BE49-F238E27FC236}">
-                <a16:creationId xmlns:a16="http://schemas.microsoft.com/office/drawing/2014/main" id="{447B9BA6-E7F1-2143-B4E3-ADA207ED875E}"/>
+                <a16:creationId xmlns:a16="http://schemas.microsoft.com/office/drawing/2014/main" id="{790A9B8F-C4E5-244C-A068-B6774C862E9D}"/>
               </a:ext>
             </a:extLst>
           </p:cNvPr>
@@ -8175,31 +8175,26 @@
               </a:ext>
             </a:extLst>
           </a:blip>
-          <a:srcRect/>
           <a:stretch>
             <a:fillRect/>
           </a:stretch>
         </p:blipFill>
-        <p:spPr bwMode="auto">
-          <a:xfrm>
-            <a:off x="680320" y="2336873"/>
-            <a:ext cx="4698358" cy="3599316"/>
+        <p:spPr>
+          <a:xfrm>
+            <a:off x="5594123" y="2336873"/>
+            <a:ext cx="4700058" cy="3599316"/>
           </a:xfrm>
           <a:prstGeom prst="rect">
             <a:avLst/>
           </a:prstGeom>
-          <a:noFill/>
-          <a:ln>
-            <a:noFill/>
-          </a:ln>
         </p:spPr>
       </p:pic>
       <p:pic>
         <p:nvPicPr>
-          <p:cNvPr id="10" name="Picture 9">
+          <p:cNvPr id="7" name="Picture 6">
             <a:extLst>
               <a:ext uri="{FF2B5EF4-FFF2-40B4-BE49-F238E27FC236}">
-                <a16:creationId xmlns:a16="http://schemas.microsoft.com/office/drawing/2014/main" id="{790A9B8F-C4E5-244C-A068-B6774C862E9D}"/>
+                <a16:creationId xmlns:a16="http://schemas.microsoft.com/office/drawing/2014/main" id="{3A396D4A-C903-E64C-95B6-0E90CF0CEC00}"/>
               </a:ext>
             </a:extLst>
           </p:cNvPr>
@@ -8220,8 +8215,8 @@
         </p:blipFill>
         <p:spPr>
           <a:xfrm>
-            <a:off x="5594123" y="2336873"/>
-            <a:ext cx="4700058" cy="3599316"/>
+            <a:off x="680320" y="2336873"/>
+            <a:ext cx="4698358" cy="3599316"/>
           </a:xfrm>
           <a:prstGeom prst="rect">
             <a:avLst/>

</xml_diff>